<commit_message>
[prg1] Adding presentations and notes
</commit_message>
<xml_diff>
--- a/data/2018-19/prg1/cv4/prg1_cv4.pptx
+++ b/data/2018-19/prg1/cv4/prg1_cv4.pptx
@@ -107,6 +107,11 @@
       </a:defRPr>
     </a:lvl9pPr>
   </p:defaultTextStyle>
+  <p:extLst>
+    <p:ext uri="{EFAFB233-063F-42B5-8137-9DF3F51BA10A}">
+      <p15:sldGuideLst xmlns:p15="http://schemas.microsoft.com/office/powerpoint/2012/main"/>
+    </p:ext>
+  </p:extLst>
 </p:presentation>
 </file>
 
@@ -7698,6 +7703,13 @@
   <p:clrMapOvr>
     <a:masterClrMapping/>
   </p:clrMapOvr>
+  <p:timing>
+    <p:tnLst>
+      <p:par>
+        <p:cTn id="1" dur="indefinite" restart="never" nodeType="tmRoot"/>
+      </p:par>
+    </p:tnLst>
+  </p:timing>
 </p:sld>
 </file>
 
@@ -7873,6 +7885,13 @@
   <p:clrMapOvr>
     <a:masterClrMapping/>
   </p:clrMapOvr>
+  <p:timing>
+    <p:tnLst>
+      <p:par>
+        <p:cTn id="1" dur="indefinite" restart="never" nodeType="tmRoot"/>
+      </p:par>
+    </p:tnLst>
+  </p:timing>
 </p:sld>
 </file>
 
@@ -8066,6 +8085,13 @@
   <p:clrMapOvr>
     <a:masterClrMapping/>
   </p:clrMapOvr>
+  <p:timing>
+    <p:tnLst>
+      <p:par>
+        <p:cTn id="1" dur="indefinite" restart="never" nodeType="tmRoot"/>
+      </p:par>
+    </p:tnLst>
+  </p:timing>
 </p:sld>
 </file>
 
@@ -8121,7 +8147,9 @@
         </p:nvSpPr>
         <p:spPr/>
         <p:txBody>
-          <a:bodyPr/>
+          <a:bodyPr>
+            <a:normAutofit fontScale="92500" lnSpcReduction="20000"/>
+          </a:bodyPr>
           <a:lstStyle/>
           <a:p>
             <a:pPr>
@@ -8129,25 +8157,10 @@
               <a:buAutoNum type="arabicPeriod"/>
             </a:pPr>
             <a:r>
-              <a:rPr lang="en-US" dirty="0" smtClean="0"/>
-              <a:t>Po</a:t>
-            </a:r>
-            <a:r>
               <a:rPr lang="cs-CZ" dirty="0" smtClean="0"/>
-              <a:t>čet čísel v poli</a:t>
+              <a:t>(Přesměrování vstupu)</a:t>
             </a:r>
             <a:endParaRPr lang="en-US" dirty="0" smtClean="0"/>
-          </a:p>
-          <a:p>
-            <a:pPr lvl="1"/>
-            <a:r>
-              <a:rPr lang="en-US" dirty="0" smtClean="0"/>
-              <a:t>NUM_COUNT(</a:t>
-            </a:r>
-            <a:r>
-              <a:rPr lang="cs-CZ" dirty="0" smtClean="0"/>
-              <a:t>array, x): integer</a:t>
-            </a:r>
           </a:p>
           <a:p>
             <a:pPr>
@@ -8156,70 +8169,16 @@
             </a:pPr>
             <a:r>
               <a:rPr lang="cs-CZ" dirty="0" smtClean="0"/>
-              <a:t>Hledání podřetězců v řetězci</a:t>
+              <a:t>Četnost zadaného čísla v poli</a:t>
             </a:r>
           </a:p>
           <a:p>
             <a:pPr lvl="1"/>
             <a:r>
               <a:rPr lang="cs-CZ" dirty="0" smtClean="0"/>
-              <a:t>NUM_SUBSTR(where:string, what:string)</a:t>
-            </a:r>
-          </a:p>
-          <a:p>
-            <a:pPr lvl="1"/>
-            <a:r>
-              <a:rPr lang="en-US" dirty="0" smtClean="0"/>
-              <a:t>‘</a:t>
-            </a:r>
-            <a:r>
-              <a:rPr lang="en-US" dirty="0" err="1" smtClean="0"/>
-              <a:t>Ahoj</a:t>
-            </a:r>
-            <a:r>
-              <a:rPr lang="en-US" dirty="0" smtClean="0"/>
-              <a:t> </a:t>
-            </a:r>
-            <a:r>
-              <a:rPr lang="en-US" b="1" dirty="0" err="1" smtClean="0"/>
-              <a:t>ja</a:t>
-            </a:r>
-            <a:r>
-              <a:rPr lang="en-US" dirty="0" err="1" smtClean="0"/>
-              <a:t>k</a:t>
-            </a:r>
-            <a:r>
-              <a:rPr lang="en-US" dirty="0" smtClean="0"/>
-              <a:t> se mas, </a:t>
-            </a:r>
-            <a:r>
-              <a:rPr lang="en-US" b="1" dirty="0" smtClean="0"/>
-              <a:t>ja</a:t>
-            </a:r>
-            <a:r>
-              <a:rPr lang="en-US" dirty="0" smtClean="0"/>
-              <a:t> </a:t>
-            </a:r>
-            <a:r>
-              <a:rPr lang="en-US" dirty="0" err="1" smtClean="0"/>
-              <a:t>docela</a:t>
-            </a:r>
-            <a:r>
-              <a:rPr lang="en-US" dirty="0" smtClean="0"/>
-              <a:t> </a:t>
-            </a:r>
-            <a:r>
-              <a:rPr lang="en-US" dirty="0" err="1" smtClean="0"/>
-              <a:t>dobre</a:t>
-            </a:r>
-            <a:r>
-              <a:rPr lang="en-US" dirty="0" smtClean="0"/>
-              <a:t> :)’ </a:t>
-            </a:r>
-            <a:r>
-              <a:rPr lang="cs-CZ" dirty="0" smtClean="0"/>
-              <a:t>ja?</a:t>
-            </a:r>
+              <a:t>Vypíše, kolikrát je zadané číslo v poli</a:t>
+            </a:r>
+            <a:endParaRPr lang="cs-CZ" dirty="0" smtClean="0"/>
           </a:p>
           <a:p>
             <a:pPr>
@@ -8227,9 +8186,141 @@
               <a:buAutoNum type="arabicPeriod"/>
             </a:pPr>
             <a:r>
-              <a:rPr lang="cs-CZ" smtClean="0"/>
-              <a:t>Pascalův trojúhelník (s polem)</a:t>
-            </a:r>
+              <a:rPr lang="cs-CZ" dirty="0" smtClean="0"/>
+              <a:t>Hledání podřetězců v řetězci</a:t>
+            </a:r>
+          </a:p>
+          <a:p>
+            <a:pPr lvl="1"/>
+            <a:r>
+              <a:rPr lang="cs-CZ" dirty="0" smtClean="0"/>
+              <a:t>Vypíše, kolik je podřetězců v řetězci?</a:t>
+            </a:r>
+          </a:p>
+          <a:p>
+            <a:pPr lvl="1"/>
+            <a:r>
+              <a:rPr lang="en-US" dirty="0" smtClean="0"/>
+              <a:t>‘</a:t>
+            </a:r>
+            <a:r>
+              <a:rPr lang="en-US" dirty="0" err="1" smtClean="0"/>
+              <a:t>Ahoj</a:t>
+            </a:r>
+            <a:r>
+              <a:rPr lang="en-US" dirty="0" smtClean="0"/>
+              <a:t> </a:t>
+            </a:r>
+            <a:r>
+              <a:rPr lang="en-US" b="1" dirty="0" err="1" smtClean="0"/>
+              <a:t>ja</a:t>
+            </a:r>
+            <a:r>
+              <a:rPr lang="en-US" dirty="0" err="1" smtClean="0"/>
+              <a:t>k</a:t>
+            </a:r>
+            <a:r>
+              <a:rPr lang="en-US" dirty="0" smtClean="0"/>
+              <a:t> se mas, </a:t>
+            </a:r>
+            <a:r>
+              <a:rPr lang="en-US" b="1" dirty="0" smtClean="0"/>
+              <a:t>ja</a:t>
+            </a:r>
+            <a:r>
+              <a:rPr lang="en-US" dirty="0" smtClean="0"/>
+              <a:t> </a:t>
+            </a:r>
+            <a:r>
+              <a:rPr lang="en-US" dirty="0" err="1" smtClean="0"/>
+              <a:t>docela</a:t>
+            </a:r>
+            <a:r>
+              <a:rPr lang="en-US" dirty="0" smtClean="0"/>
+              <a:t> </a:t>
+            </a:r>
+            <a:r>
+              <a:rPr lang="en-US" dirty="0" err="1" smtClean="0"/>
+              <a:t>dobre</a:t>
+            </a:r>
+            <a:r>
+              <a:rPr lang="en-US" dirty="0" smtClean="0"/>
+              <a:t> :)’ </a:t>
+            </a:r>
+            <a:r>
+              <a:rPr lang="cs-CZ" dirty="0" smtClean="0"/>
+              <a:t>ja</a:t>
+            </a:r>
+            <a:r>
+              <a:rPr lang="cs-CZ" dirty="0" smtClean="0"/>
+              <a:t>?</a:t>
+            </a:r>
+            <a:endParaRPr lang="cs-CZ" dirty="0" smtClean="0"/>
+          </a:p>
+          <a:p>
+            <a:pPr>
+              <a:buFont typeface="+mj-lt"/>
+              <a:buAutoNum type="arabicPeriod"/>
+            </a:pPr>
+            <a:r>
+              <a:rPr lang="cs-CZ" dirty="0" smtClean="0"/>
+              <a:t>Četnost elementů v poli</a:t>
+            </a:r>
+          </a:p>
+          <a:p>
+            <a:pPr lvl="1"/>
+            <a:r>
+              <a:rPr lang="cs-CZ" dirty="0" smtClean="0"/>
+              <a:t>Vypíše, kolikrát je dané číslo v poli </a:t>
+            </a:r>
+          </a:p>
+          <a:p>
+            <a:pPr lvl="1"/>
+            <a:r>
+              <a:rPr lang="cs-CZ" dirty="0" smtClean="0"/>
+              <a:t>Využít funkci z úkolu 2</a:t>
+            </a:r>
+            <a:endParaRPr lang="cs-CZ" dirty="0" smtClean="0"/>
+          </a:p>
+          <a:p>
+            <a:pPr>
+              <a:buFont typeface="+mj-lt"/>
+              <a:buAutoNum type="arabicPeriod"/>
+            </a:pPr>
+            <a:r>
+              <a:rPr lang="cs-CZ" dirty="0" smtClean="0"/>
+              <a:t>Pascalův </a:t>
+            </a:r>
+            <a:r>
+              <a:rPr lang="cs-CZ" dirty="0" smtClean="0"/>
+              <a:t>trojúhelník (s polem</a:t>
+            </a:r>
+            <a:r>
+              <a:rPr lang="cs-CZ" dirty="0" smtClean="0"/>
+              <a:t>)</a:t>
+            </a:r>
+            <a:endParaRPr lang="en-US" dirty="0" smtClean="0"/>
+          </a:p>
+          <a:p>
+            <a:pPr>
+              <a:buFont typeface="+mj-lt"/>
+              <a:buAutoNum type="arabicPeriod"/>
+            </a:pPr>
+            <a:r>
+              <a:rPr lang="en-US" dirty="0" err="1" smtClean="0"/>
+              <a:t>Vkl</a:t>
+            </a:r>
+            <a:r>
+              <a:rPr lang="cs-CZ" dirty="0" smtClean="0"/>
+              <a:t>ádání, mazání</a:t>
+            </a:r>
+          </a:p>
+          <a:p>
+            <a:pPr>
+              <a:buFont typeface="+mj-lt"/>
+              <a:buAutoNum type="arabicPeriod"/>
+            </a:pPr>
+            <a:endParaRPr lang="cs-CZ" dirty="0" smtClean="0"/>
           </a:p>
         </p:txBody>
       </p:sp>
@@ -8243,6 +8334,13 @@
   <p:clrMapOvr>
     <a:masterClrMapping/>
   </p:clrMapOvr>
+  <p:timing>
+    <p:tnLst>
+      <p:par>
+        <p:cTn id="1" dur="indefinite" restart="never" nodeType="tmRoot"/>
+      </p:par>
+    </p:tnLst>
+  </p:timing>
 </p:sld>
 </file>
 

</xml_diff>